<commit_message>
last touches on PPT
</commit_message>
<xml_diff>
--- a/Wasted Energy.pptx
+++ b/Wasted Energy.pptx
@@ -132,258 +132,6 @@
     <p1510:client id="{08BC40E8-BDAE-4984-90AF-45E39CD2CDF4}" v="494" dt="2020-07-24T20:25:08.370"/>
   </p1510:revLst>
 </p1510:revInfo>
-</file>
-
-<file path=ppt/changesInfos/changesInfo1.xml><?xml version="1.0" encoding="utf-8"?>
-<pc:chgInfo xmlns:a="http://schemas.openxmlformats.org/drawingml/2006/main" xmlns:r="http://schemas.openxmlformats.org/officeDocument/2006/relationships" xmlns:ac="http://schemas.microsoft.com/office/drawing/2013/main/command" xmlns:pc="http://schemas.microsoft.com/office/powerpoint/2013/main/command">
-  <pc:docChgLst>
-    <pc:chgData name="Guest User" providerId="Windows Live" clId="Web-{08BC40E8-BDAE-4984-90AF-45E39CD2CDF4}"/>
-    <pc:docChg chg="modSld">
-      <pc:chgData name="Guest User" userId="" providerId="Windows Live" clId="Web-{08BC40E8-BDAE-4984-90AF-45E39CD2CDF4}" dt="2020-07-24T20:25:07.855" v="483" actId="20577"/>
-      <pc:docMkLst>
-        <pc:docMk/>
-      </pc:docMkLst>
-      <pc:sldChg chg="modSp">
-        <pc:chgData name="Guest User" userId="" providerId="Windows Live" clId="Web-{08BC40E8-BDAE-4984-90AF-45E39CD2CDF4}" dt="2020-07-24T20:07:40.622" v="26" actId="20577"/>
-        <pc:sldMkLst>
-          <pc:docMk/>
-          <pc:sldMk cId="3230697141" sldId="257"/>
-        </pc:sldMkLst>
-        <pc:spChg chg="mod">
-          <ac:chgData name="Guest User" userId="" providerId="Windows Live" clId="Web-{08BC40E8-BDAE-4984-90AF-45E39CD2CDF4}" dt="2020-07-24T20:05:38.228" v="7" actId="20577"/>
-          <ac:spMkLst>
-            <pc:docMk/>
-            <pc:sldMk cId="3230697141" sldId="257"/>
-            <ac:spMk id="4" creationId="{338FF7F7-8326-405E-932F-C460EFC49E42}"/>
-          </ac:spMkLst>
-        </pc:spChg>
-        <pc:spChg chg="mod">
-          <ac:chgData name="Guest User" userId="" providerId="Windows Live" clId="Web-{08BC40E8-BDAE-4984-90AF-45E39CD2CDF4}" dt="2020-07-24T20:07:40.622" v="26" actId="20577"/>
-          <ac:spMkLst>
-            <pc:docMk/>
-            <pc:sldMk cId="3230697141" sldId="257"/>
-            <ac:spMk id="5" creationId="{80598DDE-892E-409C-9634-A00FA8933EA4}"/>
-          </ac:spMkLst>
-        </pc:spChg>
-      </pc:sldChg>
-      <pc:sldChg chg="modSp">
-        <pc:chgData name="Guest User" userId="" providerId="Windows Live" clId="Web-{08BC40E8-BDAE-4984-90AF-45E39CD2CDF4}" dt="2020-07-24T20:13:47.820" v="171" actId="20577"/>
-        <pc:sldMkLst>
-          <pc:docMk/>
-          <pc:sldMk cId="882679217" sldId="258"/>
-        </pc:sldMkLst>
-        <pc:spChg chg="mod">
-          <ac:chgData name="Guest User" userId="" providerId="Windows Live" clId="Web-{08BC40E8-BDAE-4984-90AF-45E39CD2CDF4}" dt="2020-07-24T20:08:05.404" v="31" actId="20577"/>
-          <ac:spMkLst>
-            <pc:docMk/>
-            <pc:sldMk cId="882679217" sldId="258"/>
-            <ac:spMk id="2" creationId="{A726032E-D022-44BA-A2EE-E2122B5BF1D5}"/>
-          </ac:spMkLst>
-        </pc:spChg>
-        <pc:spChg chg="mod">
-          <ac:chgData name="Guest User" userId="" providerId="Windows Live" clId="Web-{08BC40E8-BDAE-4984-90AF-45E39CD2CDF4}" dt="2020-07-24T20:13:47.820" v="171" actId="20577"/>
-          <ac:spMkLst>
-            <pc:docMk/>
-            <pc:sldMk cId="882679217" sldId="258"/>
-            <ac:spMk id="3" creationId="{EBDE8576-DFDE-44C7-8285-AC8D055217A1}"/>
-          </ac:spMkLst>
-        </pc:spChg>
-      </pc:sldChg>
-      <pc:sldChg chg="modSp">
-        <pc:chgData name="Guest User" userId="" providerId="Windows Live" clId="Web-{08BC40E8-BDAE-4984-90AF-45E39CD2CDF4}" dt="2020-07-24T20:19:11.892" v="294" actId="20577"/>
-        <pc:sldMkLst>
-          <pc:docMk/>
-          <pc:sldMk cId="2387309776" sldId="259"/>
-        </pc:sldMkLst>
-        <pc:spChg chg="mod">
-          <ac:chgData name="Guest User" userId="" providerId="Windows Live" clId="Web-{08BC40E8-BDAE-4984-90AF-45E39CD2CDF4}" dt="2020-07-24T20:05:42.041" v="10" actId="20577"/>
-          <ac:spMkLst>
-            <pc:docMk/>
-            <pc:sldMk cId="2387309776" sldId="259"/>
-            <ac:spMk id="2" creationId="{CD6887AC-3F35-468C-BB15-399DB06E8695}"/>
-          </ac:spMkLst>
-        </pc:spChg>
-        <pc:spChg chg="mod">
-          <ac:chgData name="Guest User" userId="" providerId="Windows Live" clId="Web-{08BC40E8-BDAE-4984-90AF-45E39CD2CDF4}" dt="2020-07-24T20:19:11.892" v="294" actId="20577"/>
-          <ac:spMkLst>
-            <pc:docMk/>
-            <pc:sldMk cId="2387309776" sldId="259"/>
-            <ac:spMk id="12" creationId="{C5BEBBA5-00FC-4F58-BAAA-2359FF895EBC}"/>
-          </ac:spMkLst>
-        </pc:spChg>
-      </pc:sldChg>
-      <pc:sldChg chg="modSp">
-        <pc:chgData name="Guest User" userId="" providerId="Windows Live" clId="Web-{08BC40E8-BDAE-4984-90AF-45E39CD2CDF4}" dt="2020-07-24T20:18:04.046" v="276" actId="20577"/>
-        <pc:sldMkLst>
-          <pc:docMk/>
-          <pc:sldMk cId="697875476" sldId="260"/>
-        </pc:sldMkLst>
-        <pc:spChg chg="mod">
-          <ac:chgData name="Guest User" userId="" providerId="Windows Live" clId="Web-{08BC40E8-BDAE-4984-90AF-45E39CD2CDF4}" dt="2020-07-24T20:07:50.075" v="28" actId="20577"/>
-          <ac:spMkLst>
-            <pc:docMk/>
-            <pc:sldMk cId="697875476" sldId="260"/>
-            <ac:spMk id="2" creationId="{578130F0-875E-4B4D-8556-30F56E23BDE0}"/>
-          </ac:spMkLst>
-        </pc:spChg>
-        <pc:spChg chg="mod">
-          <ac:chgData name="Guest User" userId="" providerId="Windows Live" clId="Web-{08BC40E8-BDAE-4984-90AF-45E39CD2CDF4}" dt="2020-07-24T20:18:04.046" v="276" actId="20577"/>
-          <ac:spMkLst>
-            <pc:docMk/>
-            <pc:sldMk cId="697875476" sldId="260"/>
-            <ac:spMk id="3" creationId="{9DAD172E-6E5B-4951-9D27-9A646D33EDF5}"/>
-          </ac:spMkLst>
-        </pc:spChg>
-      </pc:sldChg>
-      <pc:sldChg chg="modSp">
-        <pc:chgData name="Guest User" userId="" providerId="Windows Live" clId="Web-{08BC40E8-BDAE-4984-90AF-45E39CD2CDF4}" dt="2020-07-24T20:19:24.298" v="301" actId="1076"/>
-        <pc:sldMkLst>
-          <pc:docMk/>
-          <pc:sldMk cId="3402899433" sldId="261"/>
-        </pc:sldMkLst>
-        <pc:spChg chg="mod">
-          <ac:chgData name="Guest User" userId="" providerId="Windows Live" clId="Web-{08BC40E8-BDAE-4984-90AF-45E39CD2CDF4}" dt="2020-07-24T20:19:17.376" v="296" actId="20577"/>
-          <ac:spMkLst>
-            <pc:docMk/>
-            <pc:sldMk cId="3402899433" sldId="261"/>
-            <ac:spMk id="2" creationId="{A51720D6-1BF7-4B75-A113-ABE3B335AF7C}"/>
-          </ac:spMkLst>
-        </pc:spChg>
-        <pc:picChg chg="mod">
-          <ac:chgData name="Guest User" userId="" providerId="Windows Live" clId="Web-{08BC40E8-BDAE-4984-90AF-45E39CD2CDF4}" dt="2020-07-24T20:19:21.517" v="299" actId="1076"/>
-          <ac:picMkLst>
-            <pc:docMk/>
-            <pc:sldMk cId="3402899433" sldId="261"/>
-            <ac:picMk id="4" creationId="{4E52BE18-537F-44F0-8D99-79CE28BEABEE}"/>
-          </ac:picMkLst>
-        </pc:picChg>
-        <pc:picChg chg="mod">
-          <ac:chgData name="Guest User" userId="" providerId="Windows Live" clId="Web-{08BC40E8-BDAE-4984-90AF-45E39CD2CDF4}" dt="2020-07-24T20:19:24.298" v="301" actId="1076"/>
-          <ac:picMkLst>
-            <pc:docMk/>
-            <pc:sldMk cId="3402899433" sldId="261"/>
-            <ac:picMk id="6" creationId="{97680D9B-E823-4303-AD50-C5F7F5E4A810}"/>
-          </ac:picMkLst>
-        </pc:picChg>
-        <pc:picChg chg="mod">
-          <ac:chgData name="Guest User" userId="" providerId="Windows Live" clId="Web-{08BC40E8-BDAE-4984-90AF-45E39CD2CDF4}" dt="2020-07-24T20:19:22.939" v="300" actId="1076"/>
-          <ac:picMkLst>
-            <pc:docMk/>
-            <pc:sldMk cId="3402899433" sldId="261"/>
-            <ac:picMk id="9" creationId="{645B80CB-17E0-4382-9F77-F020D21D7C1F}"/>
-          </ac:picMkLst>
-        </pc:picChg>
-      </pc:sldChg>
-      <pc:sldChg chg="modSp">
-        <pc:chgData name="Guest User" userId="" providerId="Windows Live" clId="Web-{08BC40E8-BDAE-4984-90AF-45E39CD2CDF4}" dt="2020-07-24T20:19:33.955" v="302" actId="20577"/>
-        <pc:sldMkLst>
-          <pc:docMk/>
-          <pc:sldMk cId="3055307854" sldId="262"/>
-        </pc:sldMkLst>
-        <pc:spChg chg="mod">
-          <ac:chgData name="Guest User" userId="" providerId="Windows Live" clId="Web-{08BC40E8-BDAE-4984-90AF-45E39CD2CDF4}" dt="2020-07-24T20:19:33.955" v="302" actId="20577"/>
-          <ac:spMkLst>
-            <pc:docMk/>
-            <pc:sldMk cId="3055307854" sldId="262"/>
-            <ac:spMk id="2" creationId="{004D9898-0F59-437C-9A1E-DCECB52ADE44}"/>
-          </ac:spMkLst>
-        </pc:spChg>
-      </pc:sldChg>
-      <pc:sldChg chg="modSp">
-        <pc:chgData name="Guest User" userId="" providerId="Windows Live" clId="Web-{08BC40E8-BDAE-4984-90AF-45E39CD2CDF4}" dt="2020-07-24T20:21:29.255" v="354" actId="20577"/>
-        <pc:sldMkLst>
-          <pc:docMk/>
-          <pc:sldMk cId="3967257698" sldId="263"/>
-        </pc:sldMkLst>
-        <pc:spChg chg="mod">
-          <ac:chgData name="Guest User" userId="" providerId="Windows Live" clId="Web-{08BC40E8-BDAE-4984-90AF-45E39CD2CDF4}" dt="2020-07-24T20:20:12.143" v="318" actId="1076"/>
-          <ac:spMkLst>
-            <pc:docMk/>
-            <pc:sldMk cId="3967257698" sldId="263"/>
-            <ac:spMk id="2" creationId="{391148B9-AE8A-42CA-A1D8-622327C322C3}"/>
-          </ac:spMkLst>
-        </pc:spChg>
-        <pc:spChg chg="mod">
-          <ac:chgData name="Guest User" userId="" providerId="Windows Live" clId="Web-{08BC40E8-BDAE-4984-90AF-45E39CD2CDF4}" dt="2020-07-24T20:21:29.255" v="354" actId="20577"/>
-          <ac:spMkLst>
-            <pc:docMk/>
-            <pc:sldMk cId="3967257698" sldId="263"/>
-            <ac:spMk id="3" creationId="{FE616F08-3A10-4CBE-B840-6BD601B4B285}"/>
-          </ac:spMkLst>
-        </pc:spChg>
-      </pc:sldChg>
-      <pc:sldChg chg="modSp">
-        <pc:chgData name="Guest User" userId="" providerId="Windows Live" clId="Web-{08BC40E8-BDAE-4984-90AF-45E39CD2CDF4}" dt="2020-07-24T20:21:47.911" v="357" actId="20577"/>
-        <pc:sldMkLst>
-          <pc:docMk/>
-          <pc:sldMk cId="854629335" sldId="264"/>
-        </pc:sldMkLst>
-        <pc:spChg chg="mod">
-          <ac:chgData name="Guest User" userId="" providerId="Windows Live" clId="Web-{08BC40E8-BDAE-4984-90AF-45E39CD2CDF4}" dt="2020-07-24T20:21:47.911" v="357" actId="20577"/>
-          <ac:spMkLst>
-            <pc:docMk/>
-            <pc:sldMk cId="854629335" sldId="264"/>
-            <ac:spMk id="2" creationId="{E74A73E5-3003-45FD-A6E0-3BD2C6802EC1}"/>
-          </ac:spMkLst>
-        </pc:spChg>
-        <pc:spChg chg="mod">
-          <ac:chgData name="Guest User" userId="" providerId="Windows Live" clId="Web-{08BC40E8-BDAE-4984-90AF-45E39CD2CDF4}" dt="2020-07-24T20:21:04.145" v="345" actId="1076"/>
-          <ac:spMkLst>
-            <pc:docMk/>
-            <pc:sldMk cId="854629335" sldId="264"/>
-            <ac:spMk id="5" creationId="{88997452-7DEA-4693-AC30-9CB31D31C3CE}"/>
-          </ac:spMkLst>
-        </pc:spChg>
-      </pc:sldChg>
-      <pc:sldChg chg="modSp">
-        <pc:chgData name="Guest User" userId="" providerId="Windows Live" clId="Web-{08BC40E8-BDAE-4984-90AF-45E39CD2CDF4}" dt="2020-07-24T20:22:14.819" v="368" actId="20577"/>
-        <pc:sldMkLst>
-          <pc:docMk/>
-          <pc:sldMk cId="939133259" sldId="265"/>
-        </pc:sldMkLst>
-        <pc:spChg chg="mod">
-          <ac:chgData name="Guest User" userId="" providerId="Windows Live" clId="Web-{08BC40E8-BDAE-4984-90AF-45E39CD2CDF4}" dt="2020-07-24T20:21:56.193" v="362" actId="20577"/>
-          <ac:spMkLst>
-            <pc:docMk/>
-            <pc:sldMk cId="939133259" sldId="265"/>
-            <ac:spMk id="2" creationId="{4C72819A-636E-4EF7-B7D1-E4D9DCE99F21}"/>
-          </ac:spMkLst>
-        </pc:spChg>
-        <pc:spChg chg="mod">
-          <ac:chgData name="Guest User" userId="" providerId="Windows Live" clId="Web-{08BC40E8-BDAE-4984-90AF-45E39CD2CDF4}" dt="2020-07-24T20:22:14.819" v="368" actId="20577"/>
-          <ac:spMkLst>
-            <pc:docMk/>
-            <pc:sldMk cId="939133259" sldId="265"/>
-            <ac:spMk id="4" creationId="{24209FB9-9767-4273-9E5D-08660D4096F4}"/>
-          </ac:spMkLst>
-        </pc:spChg>
-      </pc:sldChg>
-      <pc:sldChg chg="modSp">
-        <pc:chgData name="Guest User" userId="" providerId="Windows Live" clId="Web-{08BC40E8-BDAE-4984-90AF-45E39CD2CDF4}" dt="2020-07-24T20:25:07.855" v="482" actId="20577"/>
-        <pc:sldMkLst>
-          <pc:docMk/>
-          <pc:sldMk cId="944582653" sldId="266"/>
-        </pc:sldMkLst>
-        <pc:spChg chg="mod">
-          <ac:chgData name="Guest User" userId="" providerId="Windows Live" clId="Web-{08BC40E8-BDAE-4984-90AF-45E39CD2CDF4}" dt="2020-07-24T20:22:22.694" v="372" actId="20577"/>
-          <ac:spMkLst>
-            <pc:docMk/>
-            <pc:sldMk cId="944582653" sldId="266"/>
-            <ac:spMk id="2" creationId="{BEDE5F7B-F291-4273-8FC1-848B4C609BE8}"/>
-          </ac:spMkLst>
-        </pc:spChg>
-        <pc:spChg chg="mod">
-          <ac:chgData name="Guest User" userId="" providerId="Windows Live" clId="Web-{08BC40E8-BDAE-4984-90AF-45E39CD2CDF4}" dt="2020-07-24T20:25:07.855" v="482" actId="20577"/>
-          <ac:spMkLst>
-            <pc:docMk/>
-            <pc:sldMk cId="944582653" sldId="266"/>
-            <ac:spMk id="3" creationId="{CB4B6C7F-6CA3-46BF-9B5F-E0A33D58E0B1}"/>
-          </ac:spMkLst>
-        </pc:spChg>
-      </pc:sldChg>
-    </pc:docChg>
-  </pc:docChgLst>
-</pc:chgInfo>
 </file>
 
 <file path=ppt/notesMasters/notesMaster1.xml><?xml version="1.0" encoding="utf-8"?>
@@ -6426,7 +6174,7 @@
           <a:p>
             <a:pPr fontAlgn="ctr"/>
             <a:r>
-              <a:rPr lang="en-US" sz="2400">
+              <a:rPr lang="en-US" sz="2400" dirty="0">
                 <a:ea typeface="+mn-lt"/>
                 <a:cs typeface="+mn-lt"/>
                 <a:hlinkClick r:id="rId3"/>
@@ -6434,7 +6182,7 @@
               <a:t>By State</a:t>
             </a:r>
             <a:r>
-              <a:rPr lang="en-US" sz="2400">
+              <a:rPr lang="en-US" sz="2400" dirty="0">
                 <a:hlinkClick r:id="rId3"/>
               </a:rPr>
               <a:t> Flared</a:t>
@@ -6448,7 +6196,7 @@
           <a:p>
             <a:pPr fontAlgn="ctr"/>
             <a:r>
-              <a:rPr lang="en-US" sz="2400">
+              <a:rPr lang="en-US" sz="2400" dirty="0">
                 <a:ea typeface="+mn-lt"/>
                 <a:cs typeface="+mn-lt"/>
                 <a:hlinkClick r:id="rId4"/>
@@ -6456,16 +6204,15 @@
               <a:t>By State</a:t>
             </a:r>
             <a:r>
-              <a:rPr lang="en-US" sz="2400">
+              <a:rPr lang="en-US" sz="2400" dirty="0">
                 <a:hlinkClick r:id="rId4"/>
               </a:rPr>
               <a:t> Crude Oil produced</a:t>
             </a:r>
             <a:r>
-              <a:rPr lang="en-US" sz="2400"/>
+              <a:rPr lang="en-US" sz="2400" dirty="0"/>
               <a:t> </a:t>
             </a:r>
-            <a:endParaRPr lang="en-US" sz="2400" dirty="0"/>
           </a:p>
           <a:p>
             <a:pPr fontAlgn="ctr"/>
@@ -6474,13 +6221,13 @@
           <a:p>
             <a:pPr fontAlgn="ctr"/>
             <a:r>
-              <a:rPr lang="en-US" sz="2400">
+              <a:rPr lang="en-US" sz="2400" dirty="0">
                 <a:hlinkClick r:id="rId5"/>
               </a:rPr>
               <a:t>By State Natural Gas production</a:t>
             </a:r>
             <a:r>
-              <a:rPr lang="en-US" sz="2400"/>
+              <a:rPr lang="en-US" sz="2400" dirty="0"/>
               <a:t> </a:t>
             </a:r>
           </a:p>
@@ -6493,6 +6240,133 @@
           </a:p>
         </p:txBody>
       </p:sp>
+      <p:pic>
+        <p:nvPicPr>
+          <p:cNvPr id="3" name="Picture 2">
+            <a:extLst>
+              <a:ext uri="{FF2B5EF4-FFF2-40B4-BE49-F238E27FC236}">
+                <a16:creationId xmlns:a16="http://schemas.microsoft.com/office/drawing/2014/main" id="{8D2BE2FE-BF52-4F34-A969-A57062A8E695}"/>
+              </a:ext>
+            </a:extLst>
+          </p:cNvPr>
+          <p:cNvPicPr>
+            <a:picLocks noChangeAspect="1"/>
+          </p:cNvPicPr>
+          <p:nvPr/>
+        </p:nvPicPr>
+        <p:blipFill>
+          <a:blip r:embed="rId6"/>
+          <a:stretch>
+            <a:fillRect/>
+          </a:stretch>
+        </p:blipFill>
+        <p:spPr>
+          <a:xfrm>
+            <a:off x="4631531" y="4081787"/>
+            <a:ext cx="5957888" cy="2095176"/>
+          </a:xfrm>
+          <a:prstGeom prst="rect">
+            <a:avLst/>
+          </a:prstGeom>
+        </p:spPr>
+      </p:pic>
+      <p:sp>
+        <p:nvSpPr>
+          <p:cNvPr id="4" name="Rectangle 3">
+            <a:extLst>
+              <a:ext uri="{FF2B5EF4-FFF2-40B4-BE49-F238E27FC236}">
+                <a16:creationId xmlns:a16="http://schemas.microsoft.com/office/drawing/2014/main" id="{D0C722A0-E233-4C2F-8F84-8EAF5A76B162}"/>
+              </a:ext>
+            </a:extLst>
+          </p:cNvPr>
+          <p:cNvSpPr/>
+          <p:nvPr/>
+        </p:nvSpPr>
+        <p:spPr>
+          <a:xfrm>
+            <a:off x="10871199" y="2691765"/>
+            <a:ext cx="482599" cy="254000"/>
+          </a:xfrm>
+          <a:prstGeom prst="rect">
+            <a:avLst/>
+          </a:prstGeom>
+          <a:noFill/>
+          <a:ln w="19050">
+            <a:solidFill>
+              <a:srgbClr val="FF0000"/>
+            </a:solidFill>
+          </a:ln>
+        </p:spPr>
+        <p:style>
+          <a:lnRef idx="2">
+            <a:schemeClr val="accent1">
+              <a:shade val="50000"/>
+            </a:schemeClr>
+          </a:lnRef>
+          <a:fillRef idx="1">
+            <a:schemeClr val="accent1"/>
+          </a:fillRef>
+          <a:effectRef idx="0">
+            <a:schemeClr val="accent1"/>
+          </a:effectRef>
+          <a:fontRef idx="minor">
+            <a:schemeClr val="lt1"/>
+          </a:fontRef>
+        </p:style>
+        <p:txBody>
+          <a:bodyPr rtlCol="0" anchor="ctr"/>
+          <a:lstStyle/>
+          <a:p>
+            <a:pPr algn="ctr"/>
+            <a:endParaRPr lang="en-US"/>
+          </a:p>
+        </p:txBody>
+      </p:sp>
+      <p:cxnSp>
+        <p:nvCxnSpPr>
+          <p:cNvPr id="8" name="Straight Arrow Connector 7">
+            <a:extLst>
+              <a:ext uri="{FF2B5EF4-FFF2-40B4-BE49-F238E27FC236}">
+                <a16:creationId xmlns:a16="http://schemas.microsoft.com/office/drawing/2014/main" id="{8A554B77-089A-4349-BD33-AB16165F2674}"/>
+              </a:ext>
+            </a:extLst>
+          </p:cNvPr>
+          <p:cNvCxnSpPr>
+            <a:stCxn id="4" idx="2"/>
+            <a:endCxn id="3" idx="0"/>
+          </p:cNvCxnSpPr>
+          <p:nvPr/>
+        </p:nvCxnSpPr>
+        <p:spPr>
+          <a:xfrm flipH="1">
+            <a:off x="7610475" y="2945765"/>
+            <a:ext cx="3502024" cy="1136022"/>
+          </a:xfrm>
+          <a:prstGeom prst="straightConnector1">
+            <a:avLst/>
+          </a:prstGeom>
+          <a:ln w="9525">
+            <a:solidFill>
+              <a:srgbClr val="FF0000"/>
+            </a:solidFill>
+            <a:tailEnd type="triangle"/>
+          </a:ln>
+        </p:spPr>
+        <p:style>
+          <a:lnRef idx="1">
+            <a:schemeClr val="accent1"/>
+          </a:lnRef>
+          <a:fillRef idx="0">
+            <a:schemeClr val="accent1"/>
+          </a:fillRef>
+          <a:effectRef idx="0">
+            <a:schemeClr val="accent1"/>
+          </a:effectRef>
+          <a:fontRef idx="minor">
+            <a:schemeClr val="tx1"/>
+          </a:fontRef>
+        </p:style>
+      </p:cxnSp>
     </p:spTree>
     <p:extLst>
       <p:ext uri="{BB962C8B-B14F-4D97-AF65-F5344CB8AC3E}">
@@ -7027,8 +6901,8 @@
           </a:p>
         </p:txBody>
       </p:sp>
-      <mc:AlternateContent xmlns:mc="http://schemas.openxmlformats.org/markup-compatibility/2006">
-        <mc:Choice xmlns:a14="http://schemas.microsoft.com/office/drawing/2010/main" Requires="a14">
+      <mc:AlternateContent xmlns:mc="http://schemas.openxmlformats.org/markup-compatibility/2006" xmlns:a14="http://schemas.microsoft.com/office/drawing/2010/main">
+        <mc:Choice Requires="a14">
           <p:sp>
             <p:nvSpPr>
               <p:cNvPr id="8" name="Content Placeholder 7">
@@ -7190,7 +7064,7 @@
             </p:txBody>
           </p:sp>
         </mc:Choice>
-        <mc:Fallback>
+        <mc:Fallback xmlns="">
           <p:sp>
             <p:nvSpPr>
               <p:cNvPr id="8" name="Content Placeholder 7">

</xml_diff>